<commit_message>
update readme workflow status
</commit_message>
<xml_diff>
--- a/docs/readme/images/Workflow.pptx
+++ b/docs/readme/images/Workflow.pptx
@@ -254,7 +254,7 @@
           <a:p>
             <a:fld id="{158267F0-2B7D-41BA-98CA-74BA82CB2C56}" type="datetimeFigureOut">
               <a:rPr lang="zh-TW" altLang="en-US" smtClean="0"/>
-              <a:t>2022/4/11</a:t>
+              <a:t>2022/4/13</a:t>
             </a:fld>
             <a:endParaRPr lang="zh-TW" altLang="en-US"/>
           </a:p>
@@ -424,7 +424,7 @@
           <a:p>
             <a:fld id="{158267F0-2B7D-41BA-98CA-74BA82CB2C56}" type="datetimeFigureOut">
               <a:rPr lang="zh-TW" altLang="en-US" smtClean="0"/>
-              <a:t>2022/4/11</a:t>
+              <a:t>2022/4/13</a:t>
             </a:fld>
             <a:endParaRPr lang="zh-TW" altLang="en-US"/>
           </a:p>
@@ -604,7 +604,7 @@
           <a:p>
             <a:fld id="{158267F0-2B7D-41BA-98CA-74BA82CB2C56}" type="datetimeFigureOut">
               <a:rPr lang="zh-TW" altLang="en-US" smtClean="0"/>
-              <a:t>2022/4/11</a:t>
+              <a:t>2022/4/13</a:t>
             </a:fld>
             <a:endParaRPr lang="zh-TW" altLang="en-US"/>
           </a:p>
@@ -774,7 +774,7 @@
           <a:p>
             <a:fld id="{158267F0-2B7D-41BA-98CA-74BA82CB2C56}" type="datetimeFigureOut">
               <a:rPr lang="zh-TW" altLang="en-US" smtClean="0"/>
-              <a:t>2022/4/11</a:t>
+              <a:t>2022/4/13</a:t>
             </a:fld>
             <a:endParaRPr lang="zh-TW" altLang="en-US"/>
           </a:p>
@@ -1020,7 +1020,7 @@
           <a:p>
             <a:fld id="{158267F0-2B7D-41BA-98CA-74BA82CB2C56}" type="datetimeFigureOut">
               <a:rPr lang="zh-TW" altLang="en-US" smtClean="0"/>
-              <a:t>2022/4/11</a:t>
+              <a:t>2022/4/13</a:t>
             </a:fld>
             <a:endParaRPr lang="zh-TW" altLang="en-US"/>
           </a:p>
@@ -1252,7 +1252,7 @@
           <a:p>
             <a:fld id="{158267F0-2B7D-41BA-98CA-74BA82CB2C56}" type="datetimeFigureOut">
               <a:rPr lang="zh-TW" altLang="en-US" smtClean="0"/>
-              <a:t>2022/4/11</a:t>
+              <a:t>2022/4/13</a:t>
             </a:fld>
             <a:endParaRPr lang="zh-TW" altLang="en-US"/>
           </a:p>
@@ -1619,7 +1619,7 @@
           <a:p>
             <a:fld id="{158267F0-2B7D-41BA-98CA-74BA82CB2C56}" type="datetimeFigureOut">
               <a:rPr lang="zh-TW" altLang="en-US" smtClean="0"/>
-              <a:t>2022/4/11</a:t>
+              <a:t>2022/4/13</a:t>
             </a:fld>
             <a:endParaRPr lang="zh-TW" altLang="en-US"/>
           </a:p>
@@ -1737,7 +1737,7 @@
           <a:p>
             <a:fld id="{158267F0-2B7D-41BA-98CA-74BA82CB2C56}" type="datetimeFigureOut">
               <a:rPr lang="zh-TW" altLang="en-US" smtClean="0"/>
-              <a:t>2022/4/11</a:t>
+              <a:t>2022/4/13</a:t>
             </a:fld>
             <a:endParaRPr lang="zh-TW" altLang="en-US"/>
           </a:p>
@@ -1832,7 +1832,7 @@
           <a:p>
             <a:fld id="{158267F0-2B7D-41BA-98CA-74BA82CB2C56}" type="datetimeFigureOut">
               <a:rPr lang="zh-TW" altLang="en-US" smtClean="0"/>
-              <a:t>2022/4/11</a:t>
+              <a:t>2022/4/13</a:t>
             </a:fld>
             <a:endParaRPr lang="zh-TW" altLang="en-US"/>
           </a:p>
@@ -2109,7 +2109,7 @@
           <a:p>
             <a:fld id="{158267F0-2B7D-41BA-98CA-74BA82CB2C56}" type="datetimeFigureOut">
               <a:rPr lang="zh-TW" altLang="en-US" smtClean="0"/>
-              <a:t>2022/4/11</a:t>
+              <a:t>2022/4/13</a:t>
             </a:fld>
             <a:endParaRPr lang="zh-TW" altLang="en-US"/>
           </a:p>
@@ -2366,7 +2366,7 @@
           <a:p>
             <a:fld id="{158267F0-2B7D-41BA-98CA-74BA82CB2C56}" type="datetimeFigureOut">
               <a:rPr lang="zh-TW" altLang="en-US" smtClean="0"/>
-              <a:t>2022/4/11</a:t>
+              <a:t>2022/4/13</a:t>
             </a:fld>
             <a:endParaRPr lang="zh-TW" altLang="en-US"/>
           </a:p>
@@ -2579,7 +2579,7 @@
           <a:p>
             <a:fld id="{158267F0-2B7D-41BA-98CA-74BA82CB2C56}" type="datetimeFigureOut">
               <a:rPr lang="zh-TW" altLang="en-US" smtClean="0"/>
-              <a:t>2022/4/11</a:t>
+              <a:t>2022/4/13</a:t>
             </a:fld>
             <a:endParaRPr lang="zh-TW" altLang="en-US"/>
           </a:p>
@@ -3528,7 +3528,7 @@
             <a:avLst/>
           </a:prstGeom>
           <a:ln w="57150">
-            <a:prstDash val="dash"/>
+            <a:prstDash val="solid"/>
             <a:headEnd type="none" w="med" len="med"/>
             <a:tailEnd type="triangle" w="med" len="med"/>
           </a:ln>
@@ -4168,7 +4168,7 @@
             </a:avLst>
           </a:prstGeom>
           <a:ln w="57150">
-            <a:prstDash val="dash"/>
+            <a:prstDash val="solid"/>
             <a:headEnd type="none" w="med" len="med"/>
             <a:tailEnd type="triangle" w="med" len="med"/>
           </a:ln>

</xml_diff>